<commit_message>
Let function setupDefaultRenderState to be called in InitGL.
</commit_message>
<xml_diff>
--- a/Slides/3 建立物理仿真程序基础/NewVersion.pptx
+++ b/Slides/3 建立物理仿真程序基础/NewVersion.pptx
@@ -27,6 +27,7 @@
     <p:sldId id="272" r:id="rId21"/>
     <p:sldId id="273" r:id="rId22"/>
     <p:sldId id="274" r:id="rId23"/>
+    <p:sldId id="279" r:id="rId24"/>
   </p:sldIdLst>
   <p:sldSz cx="9144000" cy="5143500" type="screen16x9"/>
   <p:notesSz cx="6858000" cy="9144000"/>
@@ -348,7 +349,7 @@
           <a:p>
             <a:fld id="{530820CF-B880-4189-942D-D702A7CBA730}" type="datetimeFigureOut">
               <a:rPr lang="zh-CN" altLang="en-US" smtClean="0"/>
-              <a:t>2018/9/26</a:t>
+              <a:t>2018/10/11</a:t>
             </a:fld>
             <a:endParaRPr lang="zh-CN" altLang="en-US"/>
           </a:p>
@@ -570,7 +571,7 @@
           <a:p>
             <a:fld id="{530820CF-B880-4189-942D-D702A7CBA730}" type="datetimeFigureOut">
               <a:rPr lang="zh-CN" altLang="en-US" smtClean="0"/>
-              <a:t>2018/9/26</a:t>
+              <a:t>2018/10/11</a:t>
             </a:fld>
             <a:endParaRPr lang="zh-CN" altLang="en-US"/>
           </a:p>
@@ -838,7 +839,7 @@
           <a:p>
             <a:fld id="{530820CF-B880-4189-942D-D702A7CBA730}" type="datetimeFigureOut">
               <a:rPr lang="zh-CN" altLang="en-US" smtClean="0"/>
-              <a:t>2018/9/26</a:t>
+              <a:t>2018/10/11</a:t>
             </a:fld>
             <a:endParaRPr lang="zh-CN" altLang="en-US"/>
           </a:p>
@@ -1088,7 +1089,7 @@
           <a:p>
             <a:fld id="{530820CF-B880-4189-942D-D702A7CBA730}" type="datetimeFigureOut">
               <a:rPr lang="zh-CN" altLang="en-US" smtClean="0"/>
-              <a:t>2018/9/26</a:t>
+              <a:t>2018/10/11</a:t>
             </a:fld>
             <a:endParaRPr lang="zh-CN" altLang="en-US"/>
           </a:p>
@@ -1347,7 +1348,7 @@
           <a:p>
             <a:fld id="{530820CF-B880-4189-942D-D702A7CBA730}" type="datetimeFigureOut">
               <a:rPr lang="zh-CN" altLang="en-US" smtClean="0"/>
-              <a:t>2018/9/26</a:t>
+              <a:t>2018/10/11</a:t>
             </a:fld>
             <a:endParaRPr lang="zh-CN" altLang="en-US"/>
           </a:p>
@@ -1712,7 +1713,7 @@
           <a:p>
             <a:fld id="{530820CF-B880-4189-942D-D702A7CBA730}" type="datetimeFigureOut">
               <a:rPr lang="zh-CN" altLang="en-US" smtClean="0"/>
-              <a:t>2018/9/26</a:t>
+              <a:t>2018/10/11</a:t>
             </a:fld>
             <a:endParaRPr lang="zh-CN" altLang="en-US"/>
           </a:p>
@@ -2210,7 +2211,7 @@
           <a:p>
             <a:fld id="{530820CF-B880-4189-942D-D702A7CBA730}" type="datetimeFigureOut">
               <a:rPr lang="zh-CN" altLang="en-US" smtClean="0"/>
-              <a:t>2018/9/26</a:t>
+              <a:t>2018/10/11</a:t>
             </a:fld>
             <a:endParaRPr lang="zh-CN" altLang="en-US"/>
           </a:p>
@@ -2404,7 +2405,7 @@
           <a:p>
             <a:fld id="{530820CF-B880-4189-942D-D702A7CBA730}" type="datetimeFigureOut">
               <a:rPr lang="zh-CN" altLang="en-US" smtClean="0"/>
-              <a:t>2018/9/26</a:t>
+              <a:t>2018/10/11</a:t>
             </a:fld>
             <a:endParaRPr lang="zh-CN" altLang="en-US"/>
           </a:p>
@@ -2575,7 +2576,7 @@
           <a:p>
             <a:fld id="{530820CF-B880-4189-942D-D702A7CBA730}" type="datetimeFigureOut">
               <a:rPr lang="zh-CN" altLang="en-US" smtClean="0"/>
-              <a:t>2018/9/26</a:t>
+              <a:t>2018/10/11</a:t>
             </a:fld>
             <a:endParaRPr lang="zh-CN" altLang="en-US"/>
           </a:p>
@@ -2975,7 +2976,7 @@
           <a:p>
             <a:fld id="{530820CF-B880-4189-942D-D702A7CBA730}" type="datetimeFigureOut">
               <a:rPr lang="zh-CN" altLang="en-US" smtClean="0"/>
-              <a:t>2018/9/26</a:t>
+              <a:t>2018/10/11</a:t>
             </a:fld>
             <a:endParaRPr lang="zh-CN" altLang="en-US"/>
           </a:p>
@@ -3355,7 +3356,7 @@
           <a:p>
             <a:fld id="{530820CF-B880-4189-942D-D702A7CBA730}" type="datetimeFigureOut">
               <a:rPr lang="zh-CN" altLang="en-US" smtClean="0"/>
-              <a:t>2018/9/26</a:t>
+              <a:t>2018/10/11</a:t>
             </a:fld>
             <a:endParaRPr lang="zh-CN" altLang="en-US"/>
           </a:p>
@@ -3629,7 +3630,7 @@
           <a:p>
             <a:fld id="{530820CF-B880-4189-942D-D702A7CBA730}" type="datetimeFigureOut">
               <a:rPr lang="zh-CN" altLang="en-US" smtClean="0"/>
-              <a:t>2018/9/26</a:t>
+              <a:t>2018/10/11</a:t>
             </a:fld>
             <a:endParaRPr lang="zh-CN" altLang="en-US"/>
           </a:p>
@@ -8369,6 +8370,97 @@
 </p:sld>
 </file>
 
+<file path=ppt/slides/slide23.xml><?xml version="1.0" encoding="utf-8"?>
+<p:sld xmlns:a="http://schemas.openxmlformats.org/drawingml/2006/main" xmlns:r="http://schemas.openxmlformats.org/officeDocument/2006/relationships" xmlns:p="http://schemas.openxmlformats.org/presentationml/2006/main">
+  <p:cSld>
+    <p:spTree>
+      <p:nvGrpSpPr>
+        <p:cNvPr id="1" name=""/>
+        <p:cNvGrpSpPr/>
+        <p:nvPr/>
+      </p:nvGrpSpPr>
+      <p:grpSpPr>
+        <a:xfrm>
+          <a:off x="0" y="0"/>
+          <a:ext cx="0" cy="0"/>
+          <a:chOff x="0" y="0"/>
+          <a:chExt cx="0" cy="0"/>
+        </a:xfrm>
+      </p:grpSpPr>
+      <p:sp>
+        <p:nvSpPr>
+          <p:cNvPr id="2" name="标题 1"/>
+          <p:cNvSpPr>
+            <a:spLocks noGrp="1"/>
+          </p:cNvSpPr>
+          <p:nvPr>
+            <p:ph type="title"/>
+          </p:nvPr>
+        </p:nvSpPr>
+        <p:spPr/>
+        <p:txBody>
+          <a:bodyPr/>
+          <a:lstStyle/>
+          <a:p>
+            <a:r>
+              <a:rPr lang="zh-CN" altLang="en-US" dirty="0" smtClean="0"/>
+              <a:t>练习</a:t>
+            </a:r>
+            <a:endParaRPr lang="zh-CN" altLang="en-US" dirty="0"/>
+          </a:p>
+        </p:txBody>
+      </p:sp>
+      <p:sp>
+        <p:nvSpPr>
+          <p:cNvPr id="3" name="内容占位符 2"/>
+          <p:cNvSpPr>
+            <a:spLocks noGrp="1"/>
+          </p:cNvSpPr>
+          <p:nvPr>
+            <p:ph idx="1"/>
+          </p:nvPr>
+        </p:nvSpPr>
+        <p:spPr/>
+        <p:txBody>
+          <a:bodyPr/>
+          <a:lstStyle/>
+          <a:p>
+            <a:r>
+              <a:rPr lang="zh-CN" altLang="en-US" dirty="0" smtClean="0"/>
+              <a:t>动态添加物理体</a:t>
+            </a:r>
+            <a:endParaRPr lang="en-US" altLang="zh-CN" dirty="0" smtClean="0"/>
+          </a:p>
+          <a:p>
+            <a:r>
+              <a:rPr lang="zh-CN" altLang="en-US" dirty="0" smtClean="0"/>
+              <a:t>生成新的形状的物理体（比如</a:t>
+            </a:r>
+            <a:r>
+              <a:rPr lang="en-US" altLang="zh-CN" dirty="0" smtClean="0"/>
+              <a:t>capsule</a:t>
+            </a:r>
+            <a:r>
+              <a:rPr lang="zh-CN" altLang="en-US" smtClean="0"/>
+              <a:t>）</a:t>
+            </a:r>
+            <a:endParaRPr lang="zh-CN" altLang="en-US" dirty="0"/>
+          </a:p>
+        </p:txBody>
+      </p:sp>
+    </p:spTree>
+    <p:extLst>
+      <p:ext uri="{BB962C8B-B14F-4D97-AF65-F5344CB8AC3E}">
+        <p14:creationId xmlns:p14="http://schemas.microsoft.com/office/powerpoint/2010/main" val="585265478"/>
+      </p:ext>
+    </p:extLst>
+  </p:cSld>
+  <p:clrMapOvr>
+    <a:masterClrMapping/>
+  </p:clrMapOvr>
+</p:sld>
+</file>
+
 <file path=ppt/slides/slide3.xml><?xml version="1.0" encoding="utf-8"?>
 <p:sld xmlns:a="http://schemas.openxmlformats.org/drawingml/2006/main" xmlns:r="http://schemas.openxmlformats.org/officeDocument/2006/relationships" xmlns:p="http://schemas.openxmlformats.org/presentationml/2006/main">
   <p:cSld>

</xml_diff>